<commit_message>
TympanQuad: revise the schem images
</commit_message>
<xml_diff>
--- a/Arduino/Teensy Tympan/TympanQuad/Typman RevC with 2nd AIC.pptx
+++ b/Arduino/Teensy Tympan/TympanQuad/Typman RevC with 2nd AIC.pptx
@@ -3435,7 +3435,15 @@
                       <a:srgbClr val="FF0000"/>
                     </a:solidFill>
                   </a:rPr>
-                  <a:t>SDA1 (AIC #2)</a:t>
+                  <a:t>SDA2 </a:t>
+                </a:r>
+                <a:r>
+                  <a:rPr lang="en-US" sz="1050" b="1" dirty="0" smtClean="0">
+                    <a:solidFill>
+                      <a:srgbClr val="FF0000"/>
+                    </a:solidFill>
+                  </a:rPr>
+                  <a:t>(AIC #2)</a:t>
                 </a:r>
                 <a:endParaRPr lang="en-US" sz="1050" b="1" dirty="0">
                   <a:solidFill>

</xml_diff>